<commit_message>
verlet list linearisation with 2 arrays
</commit_message>
<xml_diff>
--- a/assignment-2021/assignment-2021.pptx
+++ b/assignment-2021/assignment-2021.pptx
@@ -19406,6 +19406,20 @@
             </a:r>
           </a:p>
           <a:p>
+            <a:pPr lvl="1"/>
+            <a:r>
+              <a:rPr lang="en-GB" dirty="0"/>
+              <a:t>alternative: use 2 arrays:</a:t>
+            </a:r>
+          </a:p>
+          <a:p>
+            <a:pPr lvl="8"/>
+            <a:endParaRPr lang="en-GB" dirty="0"/>
+          </a:p>
+          <a:p>
+            <a:endParaRPr lang="en-GB" dirty="0"/>
+          </a:p>
+          <a:p>
             <a:r>
               <a:rPr lang="en-GB" dirty="0" err="1"/>
               <a:t>Verlet</a:t>
@@ -19418,13 +19432,8 @@
           <a:p>
             <a:r>
               <a:rPr lang="en-GB" dirty="0"/>
-              <a:t>1D data arrays can be passed to Fortran and C++ regardless of the storage order, because they are </a:t>
-            </a:r>
-            <a:r>
-              <a:rPr lang="en-GB"/>
-              <a:t>contiguous anyway.</a:t>
-            </a:r>
-            <a:endParaRPr lang="en-GB" dirty="0"/>
+              <a:t>1D data arrays can be passed to Fortran and C++ regardless of the storage order, because they are contiguous anyway.</a:t>
+            </a:r>
           </a:p>
         </p:txBody>
       </p:sp>
@@ -20124,7 +20133,7 @@
           <p:nvPr>
             <p:extLst>
               <p:ext uri="{D42A27DB-BD31-4B8C-83A1-F6EECF244321}">
-                <p14:modId xmlns:p14="http://schemas.microsoft.com/office/powerpoint/2010/main" val="3654847600"/>
+                <p14:modId xmlns:p14="http://schemas.microsoft.com/office/powerpoint/2010/main" val="2762582106"/>
               </p:ext>
             </p:extLst>
           </p:nvPr>
@@ -20233,7 +20242,7 @@
                     <a:p>
                       <a:pPr algn="ctr"/>
                       <a:r>
-                        <a:rPr lang="en-GB" dirty="0">
+                        <a:rPr lang="en-GB" b="0" dirty="0">
                           <a:solidFill>
                             <a:schemeClr val="tx1"/>
                           </a:solidFill>
@@ -20255,7 +20264,7 @@
                     <a:p>
                       <a:pPr algn="ctr"/>
                       <a:r>
-                        <a:rPr lang="en-GB" dirty="0">
+                        <a:rPr lang="en-GB" b="0" dirty="0">
                           <a:solidFill>
                             <a:schemeClr val="tx1"/>
                           </a:solidFill>
@@ -20280,7 +20289,7 @@
                     <a:p>
                       <a:pPr algn="ctr"/>
                       <a:r>
-                        <a:rPr lang="en-GB" dirty="0">
+                        <a:rPr lang="en-GB" b="0" dirty="0">
                           <a:solidFill>
                             <a:schemeClr val="tx1"/>
                           </a:solidFill>
@@ -20305,7 +20314,7 @@
                     <a:p>
                       <a:pPr algn="ctr"/>
                       <a:r>
-                        <a:rPr lang="en-GB" dirty="0">
+                        <a:rPr lang="en-GB" b="0" dirty="0">
                           <a:solidFill>
                             <a:schemeClr val="tx1"/>
                           </a:solidFill>
@@ -20327,7 +20336,7 @@
                     <a:p>
                       <a:pPr algn="ctr"/>
                       <a:r>
-                        <a:rPr lang="en-GB" dirty="0">
+                        <a:rPr lang="en-GB" b="0" dirty="0">
                           <a:solidFill>
                             <a:schemeClr val="tx1"/>
                           </a:solidFill>
@@ -20349,7 +20358,7 @@
                     <a:p>
                       <a:pPr algn="ctr"/>
                       <a:r>
-                        <a:rPr lang="en-GB" dirty="0">
+                        <a:rPr lang="en-GB" b="0" dirty="0">
                           <a:solidFill>
                             <a:schemeClr val="tx1"/>
                           </a:solidFill>
@@ -20371,7 +20380,7 @@
                     <a:p>
                       <a:pPr algn="ctr"/>
                       <a:r>
-                        <a:rPr lang="en-GB" dirty="0">
+                        <a:rPr lang="en-GB" b="0" dirty="0">
                           <a:solidFill>
                             <a:schemeClr val="tx1"/>
                           </a:solidFill>
@@ -20393,7 +20402,7 @@
                     <a:p>
                       <a:pPr algn="ctr"/>
                       <a:r>
-                        <a:rPr lang="en-GB" dirty="0">
+                        <a:rPr lang="en-GB" b="0" dirty="0">
                           <a:solidFill>
                             <a:schemeClr val="tx1"/>
                           </a:solidFill>
@@ -20415,7 +20424,7 @@
                     <a:p>
                       <a:pPr algn="ctr"/>
                       <a:r>
-                        <a:rPr lang="en-GB" dirty="0">
+                        <a:rPr lang="en-GB" b="0" dirty="0">
                           <a:solidFill>
                             <a:schemeClr val="tx1"/>
                           </a:solidFill>
@@ -20437,7 +20446,7 @@
                     <a:p>
                       <a:pPr algn="ctr"/>
                       <a:r>
-                        <a:rPr lang="en-GB" dirty="0">
+                        <a:rPr lang="en-GB" b="0" dirty="0">
                           <a:solidFill>
                             <a:schemeClr val="tx1"/>
                           </a:solidFill>
@@ -20459,7 +20468,7 @@
                     <a:p>
                       <a:pPr algn="ctr"/>
                       <a:r>
-                        <a:rPr lang="en-GB" dirty="0">
+                        <a:rPr lang="en-GB" b="0" dirty="0">
                           <a:solidFill>
                             <a:schemeClr val="tx1"/>
                           </a:solidFill>
@@ -20481,7 +20490,7 @@
                     <a:p>
                       <a:pPr algn="ctr"/>
                       <a:r>
-                        <a:rPr lang="en-GB" dirty="0">
+                        <a:rPr lang="en-GB" b="0" dirty="0">
                           <a:solidFill>
                             <a:schemeClr val="tx1"/>
                           </a:solidFill>
@@ -20499,6 +20508,407 @@
                 <a:extLst>
                   <a:ext uri="{0D108BD9-81ED-4DB2-BD59-A6C34878D82A}">
                     <a16:rowId xmlns:a16="http://schemas.microsoft.com/office/drawing/2014/main" val="2279274625"/>
+                  </a:ext>
+                </a:extLst>
+              </a:tr>
+            </a:tbl>
+          </a:graphicData>
+        </a:graphic>
+      </p:graphicFrame>
+      <p:graphicFrame>
+        <p:nvGraphicFramePr>
+          <p:cNvPr id="8" name="Table 6">
+            <a:extLst>
+              <a:ext uri="{FF2B5EF4-FFF2-40B4-BE49-F238E27FC236}">
+                <a16:creationId xmlns:a16="http://schemas.microsoft.com/office/drawing/2014/main" id="{AF6ED1DB-251E-B147-A02E-052CD699A855}"/>
+              </a:ext>
+            </a:extLst>
+          </p:cNvPr>
+          <p:cNvGraphicFramePr>
+            <a:graphicFrameLocks noGrp="1"/>
+          </p:cNvGraphicFramePr>
+          <p:nvPr>
+            <p:extLst>
+              <p:ext uri="{D42A27DB-BD31-4B8C-83A1-F6EECF244321}">
+                <p14:modId xmlns:p14="http://schemas.microsoft.com/office/powerpoint/2010/main" val="979269157"/>
+              </p:ext>
+            </p:extLst>
+          </p:nvPr>
+        </p:nvGraphicFramePr>
+        <p:xfrm>
+          <a:off x="902445" y="3573455"/>
+          <a:ext cx="4376610" cy="914400"/>
+        </p:xfrm>
+        <a:graphic>
+          <a:graphicData uri="http://schemas.openxmlformats.org/drawingml/2006/table">
+            <a:tbl>
+              <a:tblPr firstRow="1" bandRow="1">
+                <a:tableStyleId>{5C22544A-7EE6-4342-B048-85BDC9FD1C3A}</a:tableStyleId>
+              </a:tblPr>
+              <a:tblGrid>
+                <a:gridCol w="625230">
+                  <a:extLst>
+                    <a:ext uri="{9D8B030D-6E8A-4147-A177-3AD203B41FA5}">
+                      <a16:colId xmlns:a16="http://schemas.microsoft.com/office/drawing/2014/main" val="2605202823"/>
+                    </a:ext>
+                  </a:extLst>
+                </a:gridCol>
+                <a:gridCol w="625230">
+                  <a:extLst>
+                    <a:ext uri="{9D8B030D-6E8A-4147-A177-3AD203B41FA5}">
+                      <a16:colId xmlns:a16="http://schemas.microsoft.com/office/drawing/2014/main" val="3887054052"/>
+                    </a:ext>
+                  </a:extLst>
+                </a:gridCol>
+                <a:gridCol w="625230">
+                  <a:extLst>
+                    <a:ext uri="{9D8B030D-6E8A-4147-A177-3AD203B41FA5}">
+                      <a16:colId xmlns:a16="http://schemas.microsoft.com/office/drawing/2014/main" val="254300535"/>
+                    </a:ext>
+                  </a:extLst>
+                </a:gridCol>
+                <a:gridCol w="625230">
+                  <a:extLst>
+                    <a:ext uri="{9D8B030D-6E8A-4147-A177-3AD203B41FA5}">
+                      <a16:colId xmlns:a16="http://schemas.microsoft.com/office/drawing/2014/main" val="888679343"/>
+                    </a:ext>
+                  </a:extLst>
+                </a:gridCol>
+                <a:gridCol w="625230">
+                  <a:extLst>
+                    <a:ext uri="{9D8B030D-6E8A-4147-A177-3AD203B41FA5}">
+                      <a16:colId xmlns:a16="http://schemas.microsoft.com/office/drawing/2014/main" val="3385658626"/>
+                    </a:ext>
+                  </a:extLst>
+                </a:gridCol>
+                <a:gridCol w="625230">
+                  <a:extLst>
+                    <a:ext uri="{9D8B030D-6E8A-4147-A177-3AD203B41FA5}">
+                      <a16:colId xmlns:a16="http://schemas.microsoft.com/office/drawing/2014/main" val="2177058695"/>
+                    </a:ext>
+                  </a:extLst>
+                </a:gridCol>
+                <a:gridCol w="625230">
+                  <a:extLst>
+                    <a:ext uri="{9D8B030D-6E8A-4147-A177-3AD203B41FA5}">
+                      <a16:colId xmlns:a16="http://schemas.microsoft.com/office/drawing/2014/main" val="3159686721"/>
+                    </a:ext>
+                  </a:extLst>
+                </a:gridCol>
+              </a:tblGrid>
+              <a:tr h="370840">
+                <a:tc>
+                  <a:txBody>
+                    <a:bodyPr/>
+                    <a:lstStyle/>
+                    <a:p>
+                      <a:pPr algn="ctr"/>
+                      <a:r>
+                        <a:rPr lang="en-GB" b="0" dirty="0">
+                          <a:solidFill>
+                            <a:schemeClr val="tx1"/>
+                          </a:solidFill>
+                        </a:rPr>
+                        <a:t>2</a:t>
+                      </a:r>
+                    </a:p>
+                  </a:txBody>
+                  <a:tcPr>
+                    <a:solidFill>
+                      <a:schemeClr val="bg2"/>
+                    </a:solidFill>
+                  </a:tcPr>
+                </a:tc>
+                <a:tc>
+                  <a:txBody>
+                    <a:bodyPr/>
+                    <a:lstStyle/>
+                    <a:p>
+                      <a:pPr algn="ctr"/>
+                      <a:r>
+                        <a:rPr lang="en-GB" b="0" dirty="0">
+                          <a:solidFill>
+                            <a:schemeClr val="tx1"/>
+                          </a:solidFill>
+                        </a:rPr>
+                        <a:t>2</a:t>
+                      </a:r>
+                    </a:p>
+                  </a:txBody>
+                  <a:tcPr>
+                    <a:solidFill>
+                      <a:schemeClr val="bg2"/>
+                    </a:solidFill>
+                  </a:tcPr>
+                </a:tc>
+                <a:tc>
+                  <a:txBody>
+                    <a:bodyPr/>
+                    <a:lstStyle/>
+                    <a:p>
+                      <a:pPr algn="ctr"/>
+                      <a:r>
+                        <a:rPr lang="en-GB" b="0" dirty="0">
+                          <a:solidFill>
+                            <a:schemeClr val="tx1"/>
+                          </a:solidFill>
+                        </a:rPr>
+                        <a:t>2</a:t>
+                      </a:r>
+                    </a:p>
+                  </a:txBody>
+                  <a:tcPr>
+                    <a:solidFill>
+                      <a:schemeClr val="bg2"/>
+                    </a:solidFill>
+                  </a:tcPr>
+                </a:tc>
+                <a:tc>
+                  <a:txBody>
+                    <a:bodyPr/>
+                    <a:lstStyle/>
+                    <a:p>
+                      <a:pPr algn="ctr"/>
+                      <a:r>
+                        <a:rPr lang="en-GB" b="0" dirty="0">
+                          <a:solidFill>
+                            <a:schemeClr val="tx1"/>
+                          </a:solidFill>
+                        </a:rPr>
+                        <a:t>1</a:t>
+                      </a:r>
+                    </a:p>
+                  </a:txBody>
+                  <a:tcPr>
+                    <a:solidFill>
+                      <a:schemeClr val="bg2"/>
+                    </a:solidFill>
+                  </a:tcPr>
+                </a:tc>
+                <a:tc>
+                  <a:txBody>
+                    <a:bodyPr/>
+                    <a:lstStyle/>
+                    <a:p>
+                      <a:pPr algn="ctr"/>
+                      <a:r>
+                        <a:rPr lang="en-GB" b="0" dirty="0">
+                          <a:solidFill>
+                            <a:schemeClr val="tx1"/>
+                          </a:solidFill>
+                        </a:rPr>
+                        <a:t>0</a:t>
+                      </a:r>
+                    </a:p>
+                  </a:txBody>
+                  <a:tcPr>
+                    <a:solidFill>
+                      <a:schemeClr val="bg2"/>
+                    </a:solidFill>
+                  </a:tcPr>
+                </a:tc>
+                <a:tc>
+                  <a:txBody>
+                    <a:bodyPr/>
+                    <a:lstStyle/>
+                    <a:p>
+                      <a:pPr algn="ctr"/>
+                      <a:endParaRPr lang="en-GB" b="0" dirty="0">
+                        <a:solidFill>
+                          <a:schemeClr val="tx1"/>
+                        </a:solidFill>
+                      </a:endParaRPr>
+                    </a:p>
+                  </a:txBody>
+                  <a:tcPr>
+                    <a:solidFill>
+                      <a:schemeClr val="bg1"/>
+                    </a:solidFill>
+                  </a:tcPr>
+                </a:tc>
+                <a:tc>
+                  <a:txBody>
+                    <a:bodyPr/>
+                    <a:lstStyle/>
+                    <a:p>
+                      <a:pPr algn="ctr"/>
+                      <a:endParaRPr lang="en-GB" b="0" dirty="0">
+                        <a:solidFill>
+                          <a:schemeClr val="tx1"/>
+                        </a:solidFill>
+                      </a:endParaRPr>
+                    </a:p>
+                  </a:txBody>
+                  <a:tcPr>
+                    <a:solidFill>
+                      <a:schemeClr val="bg1"/>
+                    </a:solidFill>
+                  </a:tcPr>
+                </a:tc>
+                <a:extLst>
+                  <a:ext uri="{0D108BD9-81ED-4DB2-BD59-A6C34878D82A}">
+                    <a16:rowId xmlns:a16="http://schemas.microsoft.com/office/drawing/2014/main" val="2279274625"/>
+                  </a:ext>
+                </a:extLst>
+              </a:tr>
+              <a:tr h="370840">
+                <a:tc>
+                  <a:txBody>
+                    <a:bodyPr/>
+                    <a:lstStyle/>
+                    <a:p>
+                      <a:pPr algn="ctr"/>
+                      <a:r>
+                        <a:rPr lang="en-GB" b="0" dirty="0">
+                          <a:solidFill>
+                            <a:schemeClr val="tx1"/>
+                          </a:solidFill>
+                        </a:rPr>
+                        <a:t>1</a:t>
+                      </a:r>
+                    </a:p>
+                  </a:txBody>
+                  <a:tcPr>
+                    <a:solidFill>
+                      <a:srgbClr val="FFFF00"/>
+                    </a:solidFill>
+                  </a:tcPr>
+                </a:tc>
+                <a:tc>
+                  <a:txBody>
+                    <a:bodyPr/>
+                    <a:lstStyle/>
+                    <a:p>
+                      <a:pPr algn="ctr"/>
+                      <a:r>
+                        <a:rPr lang="en-GB" b="0" dirty="0">
+                          <a:solidFill>
+                            <a:schemeClr val="tx1"/>
+                          </a:solidFill>
+                        </a:rPr>
+                        <a:t>2</a:t>
+                      </a:r>
+                    </a:p>
+                  </a:txBody>
+                  <a:tcPr>
+                    <a:solidFill>
+                      <a:srgbClr val="FFFF00"/>
+                    </a:solidFill>
+                  </a:tcPr>
+                </a:tc>
+                <a:tc>
+                  <a:txBody>
+                    <a:bodyPr/>
+                    <a:lstStyle/>
+                    <a:p>
+                      <a:pPr algn="ctr"/>
+                      <a:r>
+                        <a:rPr lang="en-GB" b="0" dirty="0">
+                          <a:solidFill>
+                            <a:schemeClr val="tx1"/>
+                          </a:solidFill>
+                        </a:rPr>
+                        <a:t>2</a:t>
+                      </a:r>
+                    </a:p>
+                  </a:txBody>
+                  <a:tcPr>
+                    <a:solidFill>
+                      <a:srgbClr val="FFFF00"/>
+                    </a:solidFill>
+                  </a:tcPr>
+                </a:tc>
+                <a:tc>
+                  <a:txBody>
+                    <a:bodyPr/>
+                    <a:lstStyle/>
+                    <a:p>
+                      <a:pPr algn="ctr"/>
+                      <a:r>
+                        <a:rPr lang="en-GB" b="0" dirty="0">
+                          <a:solidFill>
+                            <a:schemeClr val="tx1"/>
+                          </a:solidFill>
+                        </a:rPr>
+                        <a:t>3</a:t>
+                      </a:r>
+                    </a:p>
+                  </a:txBody>
+                  <a:tcPr>
+                    <a:solidFill>
+                      <a:srgbClr val="FFFF00"/>
+                    </a:solidFill>
+                  </a:tcPr>
+                </a:tc>
+                <a:tc>
+                  <a:txBody>
+                    <a:bodyPr/>
+                    <a:lstStyle/>
+                    <a:p>
+                      <a:pPr algn="ctr"/>
+                      <a:r>
+                        <a:rPr lang="en-GB" b="0" dirty="0">
+                          <a:solidFill>
+                            <a:schemeClr val="tx1"/>
+                          </a:solidFill>
+                        </a:rPr>
+                        <a:t>3</a:t>
+                      </a:r>
+                    </a:p>
+                  </a:txBody>
+                  <a:tcPr>
+                    <a:solidFill>
+                      <a:srgbClr val="FFFF00"/>
+                    </a:solidFill>
+                  </a:tcPr>
+                </a:tc>
+                <a:tc>
+                  <a:txBody>
+                    <a:bodyPr/>
+                    <a:lstStyle/>
+                    <a:p>
+                      <a:pPr algn="ctr"/>
+                      <a:r>
+                        <a:rPr lang="en-GB" b="0" dirty="0">
+                          <a:solidFill>
+                            <a:schemeClr val="tx1"/>
+                          </a:solidFill>
+                        </a:rPr>
+                        <a:t>4</a:t>
+                      </a:r>
+                    </a:p>
+                  </a:txBody>
+                  <a:tcPr>
+                    <a:solidFill>
+                      <a:srgbClr val="FFFF00"/>
+                    </a:solidFill>
+                  </a:tcPr>
+                </a:tc>
+                <a:tc>
+                  <a:txBody>
+                    <a:bodyPr/>
+                    <a:lstStyle/>
+                    <a:p>
+                      <a:pPr algn="ctr"/>
+                      <a:r>
+                        <a:rPr lang="en-GB" b="0" dirty="0">
+                          <a:solidFill>
+                            <a:schemeClr val="tx1"/>
+                          </a:solidFill>
+                        </a:rPr>
+                        <a:t>4</a:t>
+                      </a:r>
+                    </a:p>
+                  </a:txBody>
+                  <a:tcPr>
+                    <a:solidFill>
+                      <a:srgbClr val="FFFF00"/>
+                    </a:solidFill>
+                  </a:tcPr>
+                </a:tc>
+                <a:extLst>
+                  <a:ext uri="{0D108BD9-81ED-4DB2-BD59-A6C34878D82A}">
+                    <a16:rowId xmlns:a16="http://schemas.microsoft.com/office/drawing/2014/main" val="2729666449"/>
                   </a:ext>
                 </a:extLst>
               </a:tr>

</xml_diff>

<commit_message>
reflection on linearized verlet lists
fortran vs C++
</commit_message>
<xml_diff>
--- a/assignment-2021/assignment-2021.pptx
+++ b/assignment-2021/assignment-2021.pptx
@@ -6,7 +6,7 @@
     <p:sldMasterId id="2147484114" r:id="rId5"/>
   </p:sldMasterIdLst>
   <p:notesMasterIdLst>
-    <p:notesMasterId r:id="rId39"/>
+    <p:notesMasterId r:id="rId40"/>
   </p:notesMasterIdLst>
   <p:sldIdLst>
     <p:sldId id="257" r:id="rId6"/>
@@ -42,6 +42,7 @@
     <p:sldId id="286" r:id="rId36"/>
     <p:sldId id="288" r:id="rId37"/>
     <p:sldId id="290" r:id="rId38"/>
+    <p:sldId id="291" r:id="rId39"/>
   </p:sldIdLst>
   <p:sldSz cx="12192000" cy="6858000"/>
   <p:notesSz cx="6805613" cy="9944100"/>
@@ -19435,6 +19436,12 @@
               <a:t>1D data arrays can be passed to Fortran and C++ regardless of the storage order, because they are contiguous anyway.</a:t>
             </a:r>
           </a:p>
+          <a:p>
+            <a:pPr marL="0" indent="0">
+              <a:buNone/>
+            </a:pPr>
+            <a:endParaRPr lang="en-GB" dirty="0"/>
+          </a:p>
         </p:txBody>
       </p:sp>
       <p:graphicFrame>
@@ -20929,6 +20936,173 @@
 </p:sld>
 </file>
 
+<file path=ppt/slides/slide34.xml><?xml version="1.0" encoding="utf-8"?>
+<p:sld xmlns:a="http://schemas.openxmlformats.org/drawingml/2006/main" xmlns:r="http://schemas.openxmlformats.org/officeDocument/2006/relationships" xmlns:p="http://schemas.openxmlformats.org/presentationml/2006/main">
+  <p:cSld>
+    <p:spTree>
+      <p:nvGrpSpPr>
+        <p:cNvPr id="1" name=""/>
+        <p:cNvGrpSpPr/>
+        <p:nvPr/>
+      </p:nvGrpSpPr>
+      <p:grpSpPr>
+        <a:xfrm>
+          <a:off x="0" y="0"/>
+          <a:ext cx="0" cy="0"/>
+          <a:chOff x="0" y="0"/>
+          <a:chExt cx="0" cy="0"/>
+        </a:xfrm>
+      </p:grpSpPr>
+      <p:sp>
+        <p:nvSpPr>
+          <p:cNvPr id="2" name="Title 1">
+            <a:extLst>
+              <a:ext uri="{FF2B5EF4-FFF2-40B4-BE49-F238E27FC236}">
+                <a16:creationId xmlns:a16="http://schemas.microsoft.com/office/drawing/2014/main" id="{63854F6E-2E2C-FE4D-A4FD-C190562181CE}"/>
+              </a:ext>
+            </a:extLst>
+          </p:cNvPr>
+          <p:cNvSpPr>
+            <a:spLocks noGrp="1"/>
+          </p:cNvSpPr>
+          <p:nvPr>
+            <p:ph type="title"/>
+          </p:nvPr>
+        </p:nvSpPr>
+        <p:spPr/>
+        <p:txBody>
+          <a:bodyPr/>
+          <a:lstStyle/>
+          <a:p>
+            <a:r>
+              <a:rPr lang="en-GB" dirty="0"/>
+              <a:t>Reflection</a:t>
+            </a:r>
+          </a:p>
+        </p:txBody>
+      </p:sp>
+      <p:sp>
+        <p:nvSpPr>
+          <p:cNvPr id="3" name="Slide Number Placeholder 2">
+            <a:extLst>
+              <a:ext uri="{FF2B5EF4-FFF2-40B4-BE49-F238E27FC236}">
+                <a16:creationId xmlns:a16="http://schemas.microsoft.com/office/drawing/2014/main" id="{02966652-C1ED-854D-B8CD-CA12E397ED12}"/>
+              </a:ext>
+            </a:extLst>
+          </p:cNvPr>
+          <p:cNvSpPr>
+            <a:spLocks noGrp="1"/>
+          </p:cNvSpPr>
+          <p:nvPr>
+            <p:ph type="sldNum" sz="quarter" idx="10"/>
+          </p:nvPr>
+        </p:nvSpPr>
+        <p:spPr/>
+        <p:txBody>
+          <a:bodyPr/>
+          <a:lstStyle/>
+          <a:p>
+            <a:fld id="{E038E271-308C-2E46-A3EC-56326F9084CC}" type="slidenum">
+              <a:rPr lang="nl-BE" smtClean="0"/>
+              <a:pPr/>
+              <a:t>34</a:t>
+            </a:fld>
+            <a:endParaRPr lang="nl-BE" dirty="0"/>
+          </a:p>
+        </p:txBody>
+      </p:sp>
+      <p:sp>
+        <p:nvSpPr>
+          <p:cNvPr id="4" name="Text Placeholder 3">
+            <a:extLst>
+              <a:ext uri="{FF2B5EF4-FFF2-40B4-BE49-F238E27FC236}">
+                <a16:creationId xmlns:a16="http://schemas.microsoft.com/office/drawing/2014/main" id="{72B44D18-1229-F943-9C7C-66919CF83684}"/>
+              </a:ext>
+            </a:extLst>
+          </p:cNvPr>
+          <p:cNvSpPr>
+            <a:spLocks noGrp="1"/>
+          </p:cNvSpPr>
+          <p:nvPr>
+            <p:ph type="body" sz="quarter" idx="11"/>
+          </p:nvPr>
+        </p:nvSpPr>
+        <p:spPr/>
+        <p:txBody>
+          <a:bodyPr>
+            <a:normAutofit lnSpcReduction="10000"/>
+          </a:bodyPr>
+          <a:lstStyle/>
+          <a:p>
+            <a:r>
+              <a:rPr lang="en-GB" dirty="0"/>
+              <a:t>This is an example of how software development for research is like “shooting at a moving target”</a:t>
+            </a:r>
+          </a:p>
+          <a:p>
+            <a:r>
+              <a:rPr lang="en-GB" dirty="0"/>
+              <a:t>the goal is stated in vague terms, no clear specifications of how to achieve it, many open questions, …</a:t>
+            </a:r>
+          </a:p>
+          <a:p>
+            <a:r>
+              <a:rPr lang="en-GB" dirty="0"/>
+              <a:t>the data structure that we originally proposed poses problems:</a:t>
+            </a:r>
+          </a:p>
+          <a:p>
+            <a:pPr lvl="1"/>
+            <a:r>
+              <a:rPr lang="en-GB" dirty="0"/>
+              <a:t>for Fortran to accept 2D </a:t>
+            </a:r>
+            <a:r>
+              <a:rPr lang="en-GB" dirty="0" err="1"/>
+              <a:t>numpy</a:t>
+            </a:r>
+            <a:r>
+              <a:rPr lang="en-GB" dirty="0"/>
+              <a:t> arrays, they must be created with ‘Fortran’ storage order. That makes the code dependent on the language that is used for the binary extension. If only Fortran is used, that is not really a problem, but if we also want C++, it may be the source of subtle bugs.</a:t>
+            </a:r>
+          </a:p>
+          <a:p>
+            <a:r>
+              <a:rPr lang="en-GB" dirty="0"/>
+              <a:t>The linearisation of the </a:t>
+            </a:r>
+            <a:r>
+              <a:rPr lang="en-GB" dirty="0" err="1"/>
+              <a:t>Verlet</a:t>
+            </a:r>
+            <a:r>
+              <a:rPr lang="en-GB" dirty="0"/>
+              <a:t> list solves that problem, but we need to adjust the code to take into account the new </a:t>
+            </a:r>
+            <a:r>
+              <a:rPr lang="en-GB"/>
+              <a:t>data structure</a:t>
+            </a:r>
+            <a:r>
+              <a:rPr lang="en-GB" dirty="0"/>
+              <a:t>.</a:t>
+            </a:r>
+          </a:p>
+        </p:txBody>
+      </p:sp>
+    </p:spTree>
+    <p:extLst>
+      <p:ext uri="{BB962C8B-B14F-4D97-AF65-F5344CB8AC3E}">
+        <p14:creationId xmlns:p14="http://schemas.microsoft.com/office/powerpoint/2010/main" val="263875144"/>
+      </p:ext>
+    </p:extLst>
+  </p:cSld>
+  <p:clrMapOvr>
+    <a:masterClrMapping/>
+  </p:clrMapOvr>
+</p:sld>
+</file>
+
 <file path=ppt/slides/slide4.xml><?xml version="1.0" encoding="utf-8"?>
 <p:sld xmlns:a="http://schemas.openxmlformats.org/drawingml/2006/main" xmlns:r="http://schemas.openxmlformats.org/officeDocument/2006/relationships" xmlns:p="http://schemas.openxmlformats.org/presentationml/2006/main">
   <p:cSld>

</xml_diff>